<commit_message>
Update MicroUI diagrams in the VDG (replace usage of the 'platform' terminology)
</commit_message>
<xml_diff>
--- a/VEEPortingGuide/images/java-c-net-interface.pptx
+++ b/VEEPortingGuide/images/java-c-net-interface.pptx
@@ -104,6 +104,11 @@
       </a:defRPr>
     </a:lvl9pPr>
   </p:defaultTextStyle>
+  <p:extLst>
+    <p:ext uri="{EFAFB233-063F-42B5-8137-9DF3F51BA10A}">
+      <p15:sldGuideLst xmlns:p15="http://schemas.microsoft.com/office/powerpoint/2012/main"/>
+    </p:ext>
+  </p:extLst>
 </p:presentation>
 </file>
 
@@ -256,7 +261,7 @@
           <a:p>
             <a:fld id="{4E285625-C24A-4341-90BC-6CD71F835625}" type="datetimeFigureOut">
               <a:rPr lang="en-GB" smtClean="0"/>
-              <a:t>20/03/2020</a:t>
+              <a:t>01/12/2025</a:t>
             </a:fld>
             <a:endParaRPr lang="en-GB"/>
           </a:p>
@@ -456,7 +461,7 @@
           <a:p>
             <a:fld id="{4E285625-C24A-4341-90BC-6CD71F835625}" type="datetimeFigureOut">
               <a:rPr lang="en-GB" smtClean="0"/>
-              <a:t>20/03/2020</a:t>
+              <a:t>01/12/2025</a:t>
             </a:fld>
             <a:endParaRPr lang="en-GB"/>
           </a:p>
@@ -666,7 +671,7 @@
           <a:p>
             <a:fld id="{4E285625-C24A-4341-90BC-6CD71F835625}" type="datetimeFigureOut">
               <a:rPr lang="en-GB" smtClean="0"/>
-              <a:t>20/03/2020</a:t>
+              <a:t>01/12/2025</a:t>
             </a:fld>
             <a:endParaRPr lang="en-GB"/>
           </a:p>
@@ -866,7 +871,7 @@
           <a:p>
             <a:fld id="{4E285625-C24A-4341-90BC-6CD71F835625}" type="datetimeFigureOut">
               <a:rPr lang="en-GB" smtClean="0"/>
-              <a:t>20/03/2020</a:t>
+              <a:t>01/12/2025</a:t>
             </a:fld>
             <a:endParaRPr lang="en-GB"/>
           </a:p>
@@ -1142,7 +1147,7 @@
           <a:p>
             <a:fld id="{4E285625-C24A-4341-90BC-6CD71F835625}" type="datetimeFigureOut">
               <a:rPr lang="en-GB" smtClean="0"/>
-              <a:t>20/03/2020</a:t>
+              <a:t>01/12/2025</a:t>
             </a:fld>
             <a:endParaRPr lang="en-GB"/>
           </a:p>
@@ -1410,7 +1415,7 @@
           <a:p>
             <a:fld id="{4E285625-C24A-4341-90BC-6CD71F835625}" type="datetimeFigureOut">
               <a:rPr lang="en-GB" smtClean="0"/>
-              <a:t>20/03/2020</a:t>
+              <a:t>01/12/2025</a:t>
             </a:fld>
             <a:endParaRPr lang="en-GB"/>
           </a:p>
@@ -1825,7 +1830,7 @@
           <a:p>
             <a:fld id="{4E285625-C24A-4341-90BC-6CD71F835625}" type="datetimeFigureOut">
               <a:rPr lang="en-GB" smtClean="0"/>
-              <a:t>20/03/2020</a:t>
+              <a:t>01/12/2025</a:t>
             </a:fld>
             <a:endParaRPr lang="en-GB"/>
           </a:p>
@@ -1967,7 +1972,7 @@
           <a:p>
             <a:fld id="{4E285625-C24A-4341-90BC-6CD71F835625}" type="datetimeFigureOut">
               <a:rPr lang="en-GB" smtClean="0"/>
-              <a:t>20/03/2020</a:t>
+              <a:t>01/12/2025</a:t>
             </a:fld>
             <a:endParaRPr lang="en-GB"/>
           </a:p>
@@ -2080,7 +2085,7 @@
           <a:p>
             <a:fld id="{4E285625-C24A-4341-90BC-6CD71F835625}" type="datetimeFigureOut">
               <a:rPr lang="en-GB" smtClean="0"/>
-              <a:t>20/03/2020</a:t>
+              <a:t>01/12/2025</a:t>
             </a:fld>
             <a:endParaRPr lang="en-GB"/>
           </a:p>
@@ -2393,7 +2398,7 @@
           <a:p>
             <a:fld id="{4E285625-C24A-4341-90BC-6CD71F835625}" type="datetimeFigureOut">
               <a:rPr lang="en-GB" smtClean="0"/>
-              <a:t>20/03/2020</a:t>
+              <a:t>01/12/2025</a:t>
             </a:fld>
             <a:endParaRPr lang="en-GB"/>
           </a:p>
@@ -2682,7 +2687,7 @@
           <a:p>
             <a:fld id="{4E285625-C24A-4341-90BC-6CD71F835625}" type="datetimeFigureOut">
               <a:rPr lang="en-GB" smtClean="0"/>
-              <a:t>20/03/2020</a:t>
+              <a:t>01/12/2025</a:t>
             </a:fld>
             <a:endParaRPr lang="en-GB"/>
           </a:p>
@@ -2925,7 +2930,7 @@
           <a:p>
             <a:fld id="{4E285625-C24A-4341-90BC-6CD71F835625}" type="datetimeFigureOut">
               <a:rPr lang="en-GB" smtClean="0"/>
-              <a:t>20/03/2020</a:t>
+              <a:t>01/12/2025</a:t>
             </a:fld>
             <a:endParaRPr lang="en-GB"/>
           </a:p>
@@ -4753,7 +4758,7 @@
         <p:spPr>
           <a:xfrm>
             <a:off x="2350142" y="4092481"/>
-            <a:ext cx="1281599" cy="276999"/>
+            <a:ext cx="1422327" cy="276999"/>
           </a:xfrm>
           <a:prstGeom prst="rect">
             <a:avLst/>
@@ -4798,7 +4803,7 @@
                 <a:ea typeface="Source Sans Pro Light" charset="0"/>
                 <a:cs typeface="Source Sans Pro Light" charset="0"/>
               </a:rPr>
-              <a:t>Provided by user</a:t>
+              <a:t>Provided by user(s)</a:t>
             </a:r>
           </a:p>
         </p:txBody>
@@ -4817,7 +4822,7 @@
         </p:nvSpPr>
         <p:spPr>
           <a:xfrm>
-            <a:off x="3931199" y="4101435"/>
+            <a:off x="3967059" y="4101435"/>
             <a:ext cx="1548455" cy="276999"/>
           </a:xfrm>
           <a:prstGeom prst="rect">
@@ -4857,7 +4862,7 @@
                 <a:ea typeface="Source Sans Pro Light" charset="0"/>
                 <a:cs typeface="Source Sans Pro Light" charset="0"/>
               </a:rPr>
-              <a:t>Provided by platform</a:t>
+              <a:t>Provided by VEE Port</a:t>
             </a:r>
             <a:endParaRPr kumimoji="0" lang="en-US" sz="1200" b="0" i="0" u="none" strike="noStrike" kern="0" cap="none" spc="0" normalizeH="0" baseline="0" noProof="0" dirty="0">
               <a:ln>
@@ -4890,8 +4895,8 @@
         </p:nvSpPr>
         <p:spPr>
           <a:xfrm>
-            <a:off x="2655812" y="2018627"/>
-            <a:ext cx="776204" cy="276999"/>
+            <a:off x="2581838" y="2018627"/>
+            <a:ext cx="948791" cy="276999"/>
           </a:xfrm>
           <a:prstGeom prst="rect">
             <a:avLst/>
@@ -4936,7 +4941,7 @@
                 <a:ea typeface="Source Sans Pro Light" charset="0"/>
                 <a:cs typeface="Source Sans Pro Light" charset="0"/>
               </a:rPr>
-              <a:t>Platform</a:t>
+              <a:t>Embedded</a:t>
             </a:r>
           </a:p>
         </p:txBody>
@@ -5141,7 +5146,7 @@
         </p:nvSpPr>
         <p:spPr>
           <a:xfrm>
-            <a:off x="3714317" y="4108666"/>
+            <a:off x="3777072" y="4108666"/>
             <a:ext cx="252000" cy="252000"/>
           </a:xfrm>
           <a:prstGeom prst="roundRect">

</xml_diff>